<commit_message>
Changed range for Quality
</commit_message>
<xml_diff>
--- a/_static/global/figures/Infographic_graphs/sketch diagram.pptx
+++ b/_static/global/figures/Infographic_graphs/sketch diagram.pptx
@@ -295,8 +295,8 @@
         <c:axId val="510073344"/>
         <c:scaling>
           <c:orientation val="minMax"/>
-          <c:max val="60"/>
-          <c:min val="30"/>
+          <c:max val="90"/>
+          <c:min val="60"/>
         </c:scaling>
         <c:delete val="0"/>
         <c:axPos val="l"/>
@@ -646,8 +646,8 @@
         <c:axId val="510073344"/>
         <c:scaling>
           <c:orientation val="minMax"/>
-          <c:max val="60"/>
-          <c:min val="30"/>
+          <c:max val="90"/>
+          <c:min val="60"/>
         </c:scaling>
         <c:delete val="0"/>
         <c:axPos val="l"/>
@@ -997,8 +997,8 @@
         <c:axId val="510073344"/>
         <c:scaling>
           <c:orientation val="minMax"/>
-          <c:max val="60"/>
-          <c:min val="30"/>
+          <c:max val="90"/>
+          <c:min val="60"/>
         </c:scaling>
         <c:delete val="0"/>
         <c:axPos val="l"/>
@@ -9197,7 +9197,7 @@
           <a:p>
             <a:fld id="{FACEE181-5E95-4012-89B5-E5CF011362D6}" type="datetimeFigureOut">
               <a:rPr lang="en-NL" smtClean="0"/>
-              <a:t>08/09/2021</a:t>
+              <a:t>16/02/2022</a:t>
             </a:fld>
             <a:endParaRPr lang="en-NL"/>
           </a:p>
@@ -9397,7 +9397,7 @@
           <a:p>
             <a:fld id="{FACEE181-5E95-4012-89B5-E5CF011362D6}" type="datetimeFigureOut">
               <a:rPr lang="en-NL" smtClean="0"/>
-              <a:t>08/09/2021</a:t>
+              <a:t>16/02/2022</a:t>
             </a:fld>
             <a:endParaRPr lang="en-NL"/>
           </a:p>
@@ -9607,7 +9607,7 @@
           <a:p>
             <a:fld id="{FACEE181-5E95-4012-89B5-E5CF011362D6}" type="datetimeFigureOut">
               <a:rPr lang="en-NL" smtClean="0"/>
-              <a:t>08/09/2021</a:t>
+              <a:t>16/02/2022</a:t>
             </a:fld>
             <a:endParaRPr lang="en-NL"/>
           </a:p>
@@ -9807,7 +9807,7 @@
           <a:p>
             <a:fld id="{FACEE181-5E95-4012-89B5-E5CF011362D6}" type="datetimeFigureOut">
               <a:rPr lang="en-NL" smtClean="0"/>
-              <a:t>08/09/2021</a:t>
+              <a:t>16/02/2022</a:t>
             </a:fld>
             <a:endParaRPr lang="en-NL"/>
           </a:p>
@@ -10083,7 +10083,7 @@
           <a:p>
             <a:fld id="{FACEE181-5E95-4012-89B5-E5CF011362D6}" type="datetimeFigureOut">
               <a:rPr lang="en-NL" smtClean="0"/>
-              <a:t>08/09/2021</a:t>
+              <a:t>16/02/2022</a:t>
             </a:fld>
             <a:endParaRPr lang="en-NL"/>
           </a:p>
@@ -10351,7 +10351,7 @@
           <a:p>
             <a:fld id="{FACEE181-5E95-4012-89B5-E5CF011362D6}" type="datetimeFigureOut">
               <a:rPr lang="en-NL" smtClean="0"/>
-              <a:t>08/09/2021</a:t>
+              <a:t>16/02/2022</a:t>
             </a:fld>
             <a:endParaRPr lang="en-NL"/>
           </a:p>
@@ -10766,7 +10766,7 @@
           <a:p>
             <a:fld id="{FACEE181-5E95-4012-89B5-E5CF011362D6}" type="datetimeFigureOut">
               <a:rPr lang="en-NL" smtClean="0"/>
-              <a:t>08/09/2021</a:t>
+              <a:t>16/02/2022</a:t>
             </a:fld>
             <a:endParaRPr lang="en-NL"/>
           </a:p>
@@ -10908,7 +10908,7 @@
           <a:p>
             <a:fld id="{FACEE181-5E95-4012-89B5-E5CF011362D6}" type="datetimeFigureOut">
               <a:rPr lang="en-NL" smtClean="0"/>
-              <a:t>08/09/2021</a:t>
+              <a:t>16/02/2022</a:t>
             </a:fld>
             <a:endParaRPr lang="en-NL"/>
           </a:p>
@@ -11021,7 +11021,7 @@
           <a:p>
             <a:fld id="{FACEE181-5E95-4012-89B5-E5CF011362D6}" type="datetimeFigureOut">
               <a:rPr lang="en-NL" smtClean="0"/>
-              <a:t>08/09/2021</a:t>
+              <a:t>16/02/2022</a:t>
             </a:fld>
             <a:endParaRPr lang="en-NL"/>
           </a:p>
@@ -11334,7 +11334,7 @@
           <a:p>
             <a:fld id="{FACEE181-5E95-4012-89B5-E5CF011362D6}" type="datetimeFigureOut">
               <a:rPr lang="en-NL" smtClean="0"/>
-              <a:t>08/09/2021</a:t>
+              <a:t>16/02/2022</a:t>
             </a:fld>
             <a:endParaRPr lang="en-NL"/>
           </a:p>
@@ -11623,7 +11623,7 @@
           <a:p>
             <a:fld id="{FACEE181-5E95-4012-89B5-E5CF011362D6}" type="datetimeFigureOut">
               <a:rPr lang="en-NL" smtClean="0"/>
-              <a:t>08/09/2021</a:t>
+              <a:t>16/02/2022</a:t>
             </a:fld>
             <a:endParaRPr lang="en-NL"/>
           </a:p>
@@ -11866,7 +11866,7 @@
           <a:p>
             <a:fld id="{FACEE181-5E95-4012-89B5-E5CF011362D6}" type="datetimeFigureOut">
               <a:rPr lang="en-NL" smtClean="0"/>
-              <a:t>08/09/2021</a:t>
+              <a:t>16/02/2022</a:t>
             </a:fld>
             <a:endParaRPr lang="en-NL"/>
           </a:p>
@@ -12296,7 +12296,7 @@
           <p:nvPr>
             <p:extLst>
               <p:ext uri="{D42A27DB-BD31-4B8C-83A1-F6EECF244321}">
-                <p14:modId xmlns:p14="http://schemas.microsoft.com/office/powerpoint/2010/main" val="3499112787"/>
+                <p14:modId xmlns:p14="http://schemas.microsoft.com/office/powerpoint/2010/main" val="3090894613"/>
               </p:ext>
             </p:extLst>
           </p:nvPr>
@@ -12462,7 +12462,7 @@
           <p:nvPr>
             <p:extLst>
               <p:ext uri="{D42A27DB-BD31-4B8C-83A1-F6EECF244321}">
-                <p14:modId xmlns:p14="http://schemas.microsoft.com/office/powerpoint/2010/main" val="3140217135"/>
+                <p14:modId xmlns:p14="http://schemas.microsoft.com/office/powerpoint/2010/main" val="2447853493"/>
               </p:ext>
             </p:extLst>
           </p:nvPr>
@@ -12628,7 +12628,7 @@
           <p:nvPr>
             <p:extLst>
               <p:ext uri="{D42A27DB-BD31-4B8C-83A1-F6EECF244321}">
-                <p14:modId xmlns:p14="http://schemas.microsoft.com/office/powerpoint/2010/main" val="1158988819"/>
+                <p14:modId xmlns:p14="http://schemas.microsoft.com/office/powerpoint/2010/main" val="3043318863"/>
               </p:ext>
             </p:extLst>
           </p:nvPr>

</xml_diff>